<commit_message>
Added animation to slides
</commit_message>
<xml_diff>
--- a/slides/HackSpace Python - week 4.pptx
+++ b/slides/HackSpace Python - week 4.pptx
@@ -117,6 +117,11 @@
       </a:defRPr>
     </a:lvl9pPr>
   </p:defaultTextStyle>
+  <p:extLst>
+    <p:ext uri="{EFAFB233-063F-42B5-8137-9DF3F51BA10A}">
+      <p15:sldGuideLst xmlns:p15="http://schemas.microsoft.com/office/powerpoint/2012/main"/>
+    </p:ext>
+  </p:extLst>
 </p:presentation>
 </file>
 
@@ -251,7 +256,7 @@
           <a:p>
             <a:fld id="{16120720-AEC0-4DD7-94D1-81BFA4BF26F1}" type="datetimeFigureOut">
               <a:rPr lang="en-GB" smtClean="0"/>
-              <a:t>19/02/2016</a:t>
+              <a:t>20/02/2016</a:t>
             </a:fld>
             <a:endParaRPr lang="en-GB"/>
           </a:p>
@@ -421,7 +426,7 @@
           <a:p>
             <a:fld id="{16120720-AEC0-4DD7-94D1-81BFA4BF26F1}" type="datetimeFigureOut">
               <a:rPr lang="en-GB" smtClean="0"/>
-              <a:t>19/02/2016</a:t>
+              <a:t>20/02/2016</a:t>
             </a:fld>
             <a:endParaRPr lang="en-GB"/>
           </a:p>
@@ -601,7 +606,7 @@
           <a:p>
             <a:fld id="{16120720-AEC0-4DD7-94D1-81BFA4BF26F1}" type="datetimeFigureOut">
               <a:rPr lang="en-GB" smtClean="0"/>
-              <a:t>19/02/2016</a:t>
+              <a:t>20/02/2016</a:t>
             </a:fld>
             <a:endParaRPr lang="en-GB"/>
           </a:p>
@@ -771,7 +776,7 @@
           <a:p>
             <a:fld id="{16120720-AEC0-4DD7-94D1-81BFA4BF26F1}" type="datetimeFigureOut">
               <a:rPr lang="en-GB" smtClean="0"/>
-              <a:t>19/02/2016</a:t>
+              <a:t>20/02/2016</a:t>
             </a:fld>
             <a:endParaRPr lang="en-GB"/>
           </a:p>
@@ -1017,7 +1022,7 @@
           <a:p>
             <a:fld id="{16120720-AEC0-4DD7-94D1-81BFA4BF26F1}" type="datetimeFigureOut">
               <a:rPr lang="en-GB" smtClean="0"/>
-              <a:t>19/02/2016</a:t>
+              <a:t>20/02/2016</a:t>
             </a:fld>
             <a:endParaRPr lang="en-GB"/>
           </a:p>
@@ -1249,7 +1254,7 @@
           <a:p>
             <a:fld id="{16120720-AEC0-4DD7-94D1-81BFA4BF26F1}" type="datetimeFigureOut">
               <a:rPr lang="en-GB" smtClean="0"/>
-              <a:t>19/02/2016</a:t>
+              <a:t>20/02/2016</a:t>
             </a:fld>
             <a:endParaRPr lang="en-GB"/>
           </a:p>
@@ -1616,7 +1621,7 @@
           <a:p>
             <a:fld id="{16120720-AEC0-4DD7-94D1-81BFA4BF26F1}" type="datetimeFigureOut">
               <a:rPr lang="en-GB" smtClean="0"/>
-              <a:t>19/02/2016</a:t>
+              <a:t>20/02/2016</a:t>
             </a:fld>
             <a:endParaRPr lang="en-GB"/>
           </a:p>
@@ -1734,7 +1739,7 @@
           <a:p>
             <a:fld id="{16120720-AEC0-4DD7-94D1-81BFA4BF26F1}" type="datetimeFigureOut">
               <a:rPr lang="en-GB" smtClean="0"/>
-              <a:t>19/02/2016</a:t>
+              <a:t>20/02/2016</a:t>
             </a:fld>
             <a:endParaRPr lang="en-GB"/>
           </a:p>
@@ -1829,7 +1834,7 @@
           <a:p>
             <a:fld id="{16120720-AEC0-4DD7-94D1-81BFA4BF26F1}" type="datetimeFigureOut">
               <a:rPr lang="en-GB" smtClean="0"/>
-              <a:t>19/02/2016</a:t>
+              <a:t>20/02/2016</a:t>
             </a:fld>
             <a:endParaRPr lang="en-GB"/>
           </a:p>
@@ -2106,7 +2111,7 @@
           <a:p>
             <a:fld id="{16120720-AEC0-4DD7-94D1-81BFA4BF26F1}" type="datetimeFigureOut">
               <a:rPr lang="en-GB" smtClean="0"/>
-              <a:t>19/02/2016</a:t>
+              <a:t>20/02/2016</a:t>
             </a:fld>
             <a:endParaRPr lang="en-GB"/>
           </a:p>
@@ -2359,7 +2364,7 @@
           <a:p>
             <a:fld id="{16120720-AEC0-4DD7-94D1-81BFA4BF26F1}" type="datetimeFigureOut">
               <a:rPr lang="en-GB" smtClean="0"/>
-              <a:t>19/02/2016</a:t>
+              <a:t>20/02/2016</a:t>
             </a:fld>
             <a:endParaRPr lang="en-GB"/>
           </a:p>
@@ -2572,7 +2577,7 @@
           <a:p>
             <a:fld id="{16120720-AEC0-4DD7-94D1-81BFA4BF26F1}" type="datetimeFigureOut">
               <a:rPr lang="en-GB" smtClean="0"/>
-              <a:t>19/02/2016</a:t>
+              <a:t>20/02/2016</a:t>
             </a:fld>
             <a:endParaRPr lang="en-GB"/>
           </a:p>
@@ -3425,9 +3430,184 @@
   <p:timing>
     <p:tnLst>
       <p:par>
-        <p:cTn id="1" dur="indefinite" restart="never" nodeType="tmRoot"/>
+        <p:cTn id="1" dur="indefinite" restart="never" nodeType="tmRoot">
+          <p:childTnLst>
+            <p:seq concurrent="1" nextAc="seek">
+              <p:cTn id="2" dur="indefinite" nodeType="mainSeq">
+                <p:childTnLst>
+                  <p:par>
+                    <p:cTn id="3" fill="hold">
+                      <p:stCondLst>
+                        <p:cond delay="indefinite"/>
+                      </p:stCondLst>
+                      <p:childTnLst>
+                        <p:par>
+                          <p:cTn id="4" fill="hold">
+                            <p:stCondLst>
+                              <p:cond delay="0"/>
+                            </p:stCondLst>
+                            <p:childTnLst>
+                              <p:par>
+                                <p:cTn id="5" presetID="1" presetClass="entr" presetSubtype="0" fill="hold" grpId="0" nodeType="clickEffect">
+                                  <p:stCondLst>
+                                    <p:cond delay="0"/>
+                                  </p:stCondLst>
+                                  <p:childTnLst>
+                                    <p:set>
+                                      <p:cBhvr>
+                                        <p:cTn id="6" dur="1" fill="hold">
+                                          <p:stCondLst>
+                                            <p:cond delay="0"/>
+                                          </p:stCondLst>
+                                        </p:cTn>
+                                        <p:tgtEl>
+                                          <p:spTgt spid="7"/>
+                                        </p:tgtEl>
+                                        <p:attrNameLst>
+                                          <p:attrName>style.visibility</p:attrName>
+                                        </p:attrNameLst>
+                                      </p:cBhvr>
+                                      <p:to>
+                                        <p:strVal val="visible"/>
+                                      </p:to>
+                                    </p:set>
+                                  </p:childTnLst>
+                                </p:cTn>
+                              </p:par>
+                              <p:par>
+                                <p:cTn id="7" presetID="1" presetClass="entr" presetSubtype="0" fill="hold" nodeType="withEffect">
+                                  <p:stCondLst>
+                                    <p:cond delay="0"/>
+                                  </p:stCondLst>
+                                  <p:childTnLst>
+                                    <p:set>
+                                      <p:cBhvr>
+                                        <p:cTn id="8" dur="1" fill="hold">
+                                          <p:stCondLst>
+                                            <p:cond delay="0"/>
+                                          </p:stCondLst>
+                                        </p:cTn>
+                                        <p:tgtEl>
+                                          <p:spTgt spid="6"/>
+                                        </p:tgtEl>
+                                        <p:attrNameLst>
+                                          <p:attrName>style.visibility</p:attrName>
+                                        </p:attrNameLst>
+                                      </p:cBhvr>
+                                      <p:to>
+                                        <p:strVal val="visible"/>
+                                      </p:to>
+                                    </p:set>
+                                  </p:childTnLst>
+                                </p:cTn>
+                              </p:par>
+                              <p:par>
+                                <p:cTn id="9" presetID="1" presetClass="entr" presetSubtype="0" fill="hold" grpId="0" nodeType="withEffect">
+                                  <p:stCondLst>
+                                    <p:cond delay="0"/>
+                                  </p:stCondLst>
+                                  <p:childTnLst>
+                                    <p:set>
+                                      <p:cBhvr>
+                                        <p:cTn id="10" dur="1" fill="hold">
+                                          <p:stCondLst>
+                                            <p:cond delay="0"/>
+                                          </p:stCondLst>
+                                        </p:cTn>
+                                        <p:tgtEl>
+                                          <p:spTgt spid="4"/>
+                                        </p:tgtEl>
+                                        <p:attrNameLst>
+                                          <p:attrName>style.visibility</p:attrName>
+                                        </p:attrNameLst>
+                                      </p:cBhvr>
+                                      <p:to>
+                                        <p:strVal val="visible"/>
+                                      </p:to>
+                                    </p:set>
+                                  </p:childTnLst>
+                                </p:cTn>
+                              </p:par>
+                            </p:childTnLst>
+                          </p:cTn>
+                        </p:par>
+                      </p:childTnLst>
+                    </p:cTn>
+                  </p:par>
+                  <p:par>
+                    <p:cTn id="11" fill="hold">
+                      <p:stCondLst>
+                        <p:cond delay="indefinite"/>
+                      </p:stCondLst>
+                      <p:childTnLst>
+                        <p:par>
+                          <p:cTn id="12" fill="hold">
+                            <p:stCondLst>
+                              <p:cond delay="0"/>
+                            </p:stCondLst>
+                            <p:childTnLst>
+                              <p:par>
+                                <p:cTn id="13" presetID="1" presetClass="entr" presetSubtype="0" fill="hold" nodeType="clickEffect">
+                                  <p:stCondLst>
+                                    <p:cond delay="0"/>
+                                  </p:stCondLst>
+                                  <p:childTnLst>
+                                    <p:set>
+                                      <p:cBhvr>
+                                        <p:cTn id="14" dur="1" fill="hold">
+                                          <p:stCondLst>
+                                            <p:cond delay="0"/>
+                                          </p:stCondLst>
+                                        </p:cTn>
+                                        <p:tgtEl>
+                                          <p:spTgt spid="3">
+                                            <p:txEl>
+                                              <p:pRg st="9" end="9"/>
+                                            </p:txEl>
+                                          </p:spTgt>
+                                        </p:tgtEl>
+                                        <p:attrNameLst>
+                                          <p:attrName>style.visibility</p:attrName>
+                                        </p:attrNameLst>
+                                      </p:cBhvr>
+                                      <p:to>
+                                        <p:strVal val="visible"/>
+                                      </p:to>
+                                    </p:set>
+                                  </p:childTnLst>
+                                </p:cTn>
+                              </p:par>
+                            </p:childTnLst>
+                          </p:cTn>
+                        </p:par>
+                      </p:childTnLst>
+                    </p:cTn>
+                  </p:par>
+                </p:childTnLst>
+              </p:cTn>
+              <p:prevCondLst>
+                <p:cond evt="onPrev" delay="0">
+                  <p:tgtEl>
+                    <p:sldTgt/>
+                  </p:tgtEl>
+                </p:cond>
+              </p:prevCondLst>
+              <p:nextCondLst>
+                <p:cond evt="onNext" delay="0">
+                  <p:tgtEl>
+                    <p:sldTgt/>
+                  </p:tgtEl>
+                </p:cond>
+              </p:nextCondLst>
+            </p:seq>
+          </p:childTnLst>
+        </p:cTn>
       </p:par>
     </p:tnLst>
+    <p:bldLst>
+      <p:bldP spid="4" grpId="0"/>
+      <p:bldP spid="7" grpId="0" animBg="1"/>
+    </p:bldLst>
   </p:timing>
 </p:sld>
 </file>
@@ -3736,112 +3916,6 @@
           </a:p>
         </p:txBody>
       </p:sp>
-      <p:sp>
-        <p:nvSpPr>
-          <p:cNvPr id="4" name="TextBox 3"/>
-          <p:cNvSpPr txBox="1"/>
-          <p:nvPr/>
-        </p:nvSpPr>
-        <p:spPr>
-          <a:xfrm>
-            <a:off x="7090117" y="3887539"/>
-            <a:ext cx="3918701" cy="369332"/>
-          </a:xfrm>
-          <a:prstGeom prst="rect">
-            <a:avLst/>
-          </a:prstGeom>
-          <a:noFill/>
-        </p:spPr>
-        <p:txBody>
-          <a:bodyPr wrap="none" rtlCol="0">
-            <a:spAutoFit/>
-          </a:bodyPr>
-          <a:lstStyle/>
-          <a:p>
-            <a:r>
-              <a:rPr lang="en-GB" dirty="0" smtClean="0"/>
-              <a:t>Comma allows return of multiple values</a:t>
-            </a:r>
-            <a:endParaRPr lang="en-GB" dirty="0"/>
-          </a:p>
-        </p:txBody>
-      </p:sp>
-      <p:cxnSp>
-        <p:nvCxnSpPr>
-          <p:cNvPr id="6" name="Straight Arrow Connector 5"/>
-          <p:cNvCxnSpPr>
-            <a:endCxn id="7" idx="0"/>
-          </p:cNvCxnSpPr>
-          <p:nvPr/>
-        </p:nvCxnSpPr>
-        <p:spPr>
-          <a:xfrm flipH="1">
-            <a:off x="5050301" y="3995225"/>
-            <a:ext cx="2039816" cy="153961"/>
-          </a:xfrm>
-          <a:prstGeom prst="straightConnector1">
-            <a:avLst/>
-          </a:prstGeom>
-          <a:ln w="38100">
-            <a:tailEnd type="triangle"/>
-          </a:ln>
-        </p:spPr>
-        <p:style>
-          <a:lnRef idx="1">
-            <a:schemeClr val="accent1"/>
-          </a:lnRef>
-          <a:fillRef idx="0">
-            <a:schemeClr val="accent1"/>
-          </a:fillRef>
-          <a:effectRef idx="0">
-            <a:schemeClr val="accent1"/>
-          </a:effectRef>
-          <a:fontRef idx="minor">
-            <a:schemeClr val="tx1"/>
-          </a:fontRef>
-        </p:style>
-      </p:cxnSp>
-      <p:sp>
-        <p:nvSpPr>
-          <p:cNvPr id="7" name="Rectangle 6"/>
-          <p:cNvSpPr/>
-          <p:nvPr/>
-        </p:nvSpPr>
-        <p:spPr>
-          <a:xfrm>
-            <a:off x="4965894" y="4149186"/>
-            <a:ext cx="168813" cy="282138"/>
-          </a:xfrm>
-          <a:prstGeom prst="rect">
-            <a:avLst/>
-          </a:prstGeom>
-          <a:noFill/>
-        </p:spPr>
-        <p:style>
-          <a:lnRef idx="2">
-            <a:schemeClr val="accent1">
-              <a:shade val="50000"/>
-            </a:schemeClr>
-          </a:lnRef>
-          <a:fillRef idx="1">
-            <a:schemeClr val="accent1"/>
-          </a:fillRef>
-          <a:effectRef idx="0">
-            <a:schemeClr val="accent1"/>
-          </a:effectRef>
-          <a:fontRef idx="minor">
-            <a:schemeClr val="lt1"/>
-          </a:fontRef>
-        </p:style>
-        <p:txBody>
-          <a:bodyPr rtlCol="0" anchor="ctr"/>
-          <a:lstStyle/>
-          <a:p>
-            <a:pPr algn="ctr"/>
-            <a:endParaRPr lang="en-GB"/>
-          </a:p>
-        </p:txBody>
-      </p:sp>
     </p:spTree>
     <p:extLst>
       <p:ext uri="{BB962C8B-B14F-4D97-AF65-F5344CB8AC3E}">
@@ -3855,7 +3929,128 @@
   <p:timing>
     <p:tnLst>
       <p:par>
-        <p:cTn id="1" dur="indefinite" restart="never" nodeType="tmRoot"/>
+        <p:cTn id="1" dur="indefinite" restart="never" nodeType="tmRoot">
+          <p:childTnLst>
+            <p:seq concurrent="1" nextAc="seek">
+              <p:cTn id="2" dur="indefinite" nodeType="mainSeq">
+                <p:childTnLst>
+                  <p:par>
+                    <p:cTn id="3" fill="hold">
+                      <p:stCondLst>
+                        <p:cond delay="indefinite"/>
+                      </p:stCondLst>
+                      <p:childTnLst>
+                        <p:par>
+                          <p:cTn id="4" fill="hold">
+                            <p:stCondLst>
+                              <p:cond delay="0"/>
+                            </p:stCondLst>
+                            <p:childTnLst>
+                              <p:par>
+                                <p:cTn id="5" presetID="1" presetClass="entr" presetSubtype="0" fill="hold" nodeType="clickEffect">
+                                  <p:stCondLst>
+                                    <p:cond delay="0"/>
+                                  </p:stCondLst>
+                                  <p:childTnLst>
+                                    <p:set>
+                                      <p:cBhvr>
+                                        <p:cTn id="6" dur="1" fill="hold">
+                                          <p:stCondLst>
+                                            <p:cond delay="0"/>
+                                          </p:stCondLst>
+                                        </p:cTn>
+                                        <p:tgtEl>
+                                          <p:spTgt spid="3">
+                                            <p:txEl>
+                                              <p:pRg st="10" end="10"/>
+                                            </p:txEl>
+                                          </p:spTgt>
+                                        </p:tgtEl>
+                                        <p:attrNameLst>
+                                          <p:attrName>style.visibility</p:attrName>
+                                        </p:attrNameLst>
+                                      </p:cBhvr>
+                                      <p:to>
+                                        <p:strVal val="visible"/>
+                                      </p:to>
+                                    </p:set>
+                                  </p:childTnLst>
+                                </p:cTn>
+                              </p:par>
+                            </p:childTnLst>
+                          </p:cTn>
+                        </p:par>
+                      </p:childTnLst>
+                    </p:cTn>
+                  </p:par>
+                  <p:par>
+                    <p:cTn id="7" fill="hold">
+                      <p:stCondLst>
+                        <p:cond delay="indefinite"/>
+                      </p:stCondLst>
+                      <p:childTnLst>
+                        <p:par>
+                          <p:cTn id="8" fill="hold">
+                            <p:stCondLst>
+                              <p:cond delay="0"/>
+                            </p:stCondLst>
+                            <p:childTnLst>
+                              <p:par>
+                                <p:cTn id="9" presetID="1" presetClass="entr" presetSubtype="0" fill="hold" nodeType="clickEffect">
+                                  <p:stCondLst>
+                                    <p:cond delay="0"/>
+                                  </p:stCondLst>
+                                  <p:childTnLst>
+                                    <p:set>
+                                      <p:cBhvr>
+                                        <p:cTn id="10" dur="1" fill="hold">
+                                          <p:stCondLst>
+                                            <p:cond delay="0"/>
+                                          </p:stCondLst>
+                                        </p:cTn>
+                                        <p:tgtEl>
+                                          <p:spTgt spid="3">
+                                            <p:txEl>
+                                              <p:pRg st="11" end="11"/>
+                                            </p:txEl>
+                                          </p:spTgt>
+                                        </p:tgtEl>
+                                        <p:attrNameLst>
+                                          <p:attrName>style.visibility</p:attrName>
+                                        </p:attrNameLst>
+                                      </p:cBhvr>
+                                      <p:to>
+                                        <p:strVal val="visible"/>
+                                      </p:to>
+                                    </p:set>
+                                  </p:childTnLst>
+                                </p:cTn>
+                              </p:par>
+                            </p:childTnLst>
+                          </p:cTn>
+                        </p:par>
+                      </p:childTnLst>
+                    </p:cTn>
+                  </p:par>
+                </p:childTnLst>
+              </p:cTn>
+              <p:prevCondLst>
+                <p:cond evt="onPrev" delay="0">
+                  <p:tgtEl>
+                    <p:sldTgt/>
+                  </p:tgtEl>
+                </p:cond>
+              </p:prevCondLst>
+              <p:nextCondLst>
+                <p:cond evt="onNext" delay="0">
+                  <p:tgtEl>
+                    <p:sldTgt/>
+                  </p:tgtEl>
+                </p:cond>
+              </p:nextCondLst>
+            </p:seq>
+          </p:childTnLst>
+        </p:cTn>
       </p:par>
     </p:tnLst>
   </p:timing>
@@ -4322,9 +4517,233 @@
   <p:timing>
     <p:tnLst>
       <p:par>
-        <p:cTn id="1" dur="indefinite" restart="never" nodeType="tmRoot"/>
+        <p:cTn id="1" dur="indefinite" restart="never" nodeType="tmRoot">
+          <p:childTnLst>
+            <p:seq concurrent="1" nextAc="seek">
+              <p:cTn id="2" dur="indefinite" nodeType="mainSeq">
+                <p:childTnLst>
+                  <p:par>
+                    <p:cTn id="3" fill="hold">
+                      <p:stCondLst>
+                        <p:cond delay="indefinite"/>
+                      </p:stCondLst>
+                      <p:childTnLst>
+                        <p:par>
+                          <p:cTn id="4" fill="hold">
+                            <p:stCondLst>
+                              <p:cond delay="0"/>
+                            </p:stCondLst>
+                            <p:childTnLst>
+                              <p:par>
+                                <p:cTn id="5" presetID="1" presetClass="entr" presetSubtype="0" fill="hold" grpId="0" nodeType="clickEffect">
+                                  <p:stCondLst>
+                                    <p:cond delay="0"/>
+                                  </p:stCondLst>
+                                  <p:childTnLst>
+                                    <p:set>
+                                      <p:cBhvr>
+                                        <p:cTn id="6" dur="1" fill="hold">
+                                          <p:stCondLst>
+                                            <p:cond delay="0"/>
+                                          </p:stCondLst>
+                                        </p:cTn>
+                                        <p:tgtEl>
+                                          <p:spTgt spid="7"/>
+                                        </p:tgtEl>
+                                        <p:attrNameLst>
+                                          <p:attrName>style.visibility</p:attrName>
+                                        </p:attrNameLst>
+                                      </p:cBhvr>
+                                      <p:to>
+                                        <p:strVal val="visible"/>
+                                      </p:to>
+                                    </p:set>
+                                  </p:childTnLst>
+                                </p:cTn>
+                              </p:par>
+                              <p:par>
+                                <p:cTn id="7" presetID="1" presetClass="entr" presetSubtype="0" fill="hold" nodeType="withEffect">
+                                  <p:stCondLst>
+                                    <p:cond delay="0"/>
+                                  </p:stCondLst>
+                                  <p:childTnLst>
+                                    <p:set>
+                                      <p:cBhvr>
+                                        <p:cTn id="8" dur="1" fill="hold">
+                                          <p:stCondLst>
+                                            <p:cond delay="0"/>
+                                          </p:stCondLst>
+                                        </p:cTn>
+                                        <p:tgtEl>
+                                          <p:spTgt spid="6"/>
+                                        </p:tgtEl>
+                                        <p:attrNameLst>
+                                          <p:attrName>style.visibility</p:attrName>
+                                        </p:attrNameLst>
+                                      </p:cBhvr>
+                                      <p:to>
+                                        <p:strVal val="visible"/>
+                                      </p:to>
+                                    </p:set>
+                                  </p:childTnLst>
+                                </p:cTn>
+                              </p:par>
+                              <p:par>
+                                <p:cTn id="9" presetID="1" presetClass="entr" presetSubtype="0" fill="hold" grpId="0" nodeType="withEffect">
+                                  <p:stCondLst>
+                                    <p:cond delay="0"/>
+                                  </p:stCondLst>
+                                  <p:childTnLst>
+                                    <p:set>
+                                      <p:cBhvr>
+                                        <p:cTn id="10" dur="1" fill="hold">
+                                          <p:stCondLst>
+                                            <p:cond delay="0"/>
+                                          </p:stCondLst>
+                                        </p:cTn>
+                                        <p:tgtEl>
+                                          <p:spTgt spid="4"/>
+                                        </p:tgtEl>
+                                        <p:attrNameLst>
+                                          <p:attrName>style.visibility</p:attrName>
+                                        </p:attrNameLst>
+                                      </p:cBhvr>
+                                      <p:to>
+                                        <p:strVal val="visible"/>
+                                      </p:to>
+                                    </p:set>
+                                  </p:childTnLst>
+                                </p:cTn>
+                              </p:par>
+                            </p:childTnLst>
+                          </p:cTn>
+                        </p:par>
+                      </p:childTnLst>
+                    </p:cTn>
+                  </p:par>
+                  <p:par>
+                    <p:cTn id="11" fill="hold">
+                      <p:stCondLst>
+                        <p:cond delay="indefinite"/>
+                      </p:stCondLst>
+                      <p:childTnLst>
+                        <p:par>
+                          <p:cTn id="12" fill="hold">
+                            <p:stCondLst>
+                              <p:cond delay="0"/>
+                            </p:stCondLst>
+                            <p:childTnLst>
+                              <p:par>
+                                <p:cTn id="13" presetID="1" presetClass="entr" presetSubtype="0" fill="hold" nodeType="clickEffect">
+                                  <p:stCondLst>
+                                    <p:cond delay="0"/>
+                                  </p:stCondLst>
+                                  <p:childTnLst>
+                                    <p:set>
+                                      <p:cBhvr>
+                                        <p:cTn id="14" dur="1" fill="hold">
+                                          <p:stCondLst>
+                                            <p:cond delay="0"/>
+                                          </p:stCondLst>
+                                        </p:cTn>
+                                        <p:tgtEl>
+                                          <p:spTgt spid="3">
+                                            <p:txEl>
+                                              <p:pRg st="9" end="9"/>
+                                            </p:txEl>
+                                          </p:spTgt>
+                                        </p:tgtEl>
+                                        <p:attrNameLst>
+                                          <p:attrName>style.visibility</p:attrName>
+                                        </p:attrNameLst>
+                                      </p:cBhvr>
+                                      <p:to>
+                                        <p:strVal val="visible"/>
+                                      </p:to>
+                                    </p:set>
+                                  </p:childTnLst>
+                                </p:cTn>
+                              </p:par>
+                            </p:childTnLst>
+                          </p:cTn>
+                        </p:par>
+                      </p:childTnLst>
+                    </p:cTn>
+                  </p:par>
+                  <p:par>
+                    <p:cTn id="15" fill="hold">
+                      <p:stCondLst>
+                        <p:cond delay="indefinite"/>
+                      </p:stCondLst>
+                      <p:childTnLst>
+                        <p:par>
+                          <p:cTn id="16" fill="hold">
+                            <p:stCondLst>
+                              <p:cond delay="0"/>
+                            </p:stCondLst>
+                            <p:childTnLst>
+                              <p:par>
+                                <p:cTn id="17" presetID="1" presetClass="entr" presetSubtype="0" fill="hold" nodeType="clickEffect">
+                                  <p:stCondLst>
+                                    <p:cond delay="0"/>
+                                  </p:stCondLst>
+                                  <p:childTnLst>
+                                    <p:set>
+                                      <p:cBhvr>
+                                        <p:cTn id="18" dur="1" fill="hold">
+                                          <p:stCondLst>
+                                            <p:cond delay="0"/>
+                                          </p:stCondLst>
+                                        </p:cTn>
+                                        <p:tgtEl>
+                                          <p:spTgt spid="3">
+                                            <p:txEl>
+                                              <p:pRg st="10" end="10"/>
+                                            </p:txEl>
+                                          </p:spTgt>
+                                        </p:tgtEl>
+                                        <p:attrNameLst>
+                                          <p:attrName>style.visibility</p:attrName>
+                                        </p:attrNameLst>
+                                      </p:cBhvr>
+                                      <p:to>
+                                        <p:strVal val="visible"/>
+                                      </p:to>
+                                    </p:set>
+                                  </p:childTnLst>
+                                </p:cTn>
+                              </p:par>
+                            </p:childTnLst>
+                          </p:cTn>
+                        </p:par>
+                      </p:childTnLst>
+                    </p:cTn>
+                  </p:par>
+                </p:childTnLst>
+              </p:cTn>
+              <p:prevCondLst>
+                <p:cond evt="onPrev" delay="0">
+                  <p:tgtEl>
+                    <p:sldTgt/>
+                  </p:tgtEl>
+                </p:cond>
+              </p:prevCondLst>
+              <p:nextCondLst>
+                <p:cond evt="onNext" delay="0">
+                  <p:tgtEl>
+                    <p:sldTgt/>
+                  </p:tgtEl>
+                </p:cond>
+              </p:nextCondLst>
+            </p:seq>
+          </p:childTnLst>
+        </p:cTn>
       </p:par>
     </p:tnLst>
+    <p:bldLst>
+      <p:bldP spid="4" grpId="0"/>
+      <p:bldP spid="7" grpId="0" animBg="1"/>
+    </p:bldLst>
   </p:timing>
 </p:sld>
 </file>
@@ -4584,12 +5003,16 @@
             </a:r>
           </a:p>
           <a:p>
-            <a:pPr marL="914400" lvl="2" indent="0">
+            <a:pPr marL="0" indent="0">
               <a:buNone/>
             </a:pPr>
             <a:r>
               <a:rPr lang="en-GB" dirty="0" smtClean="0"/>
-              <a:t>Output:</a:t>
+              <a:t>Output</a:t>
+            </a:r>
+            <a:r>
+              <a:rPr lang="en-GB" dirty="0" smtClean="0"/>
+              <a:t>:</a:t>
             </a:r>
           </a:p>
           <a:p>
@@ -4954,9 +5377,350 @@
   <p:timing>
     <p:tnLst>
       <p:par>
-        <p:cTn id="1" dur="indefinite" restart="never" nodeType="tmRoot"/>
+        <p:cTn id="1" dur="indefinite" restart="never" nodeType="tmRoot">
+          <p:childTnLst>
+            <p:seq concurrent="1" nextAc="seek">
+              <p:cTn id="2" dur="indefinite" nodeType="mainSeq">
+                <p:childTnLst>
+                  <p:par>
+                    <p:cTn id="3" fill="hold">
+                      <p:stCondLst>
+                        <p:cond delay="indefinite"/>
+                      </p:stCondLst>
+                      <p:childTnLst>
+                        <p:par>
+                          <p:cTn id="4" fill="hold">
+                            <p:stCondLst>
+                              <p:cond delay="0"/>
+                            </p:stCondLst>
+                            <p:childTnLst>
+                              <p:par>
+                                <p:cTn id="5" presetID="1" presetClass="entr" presetSubtype="0" fill="hold" grpId="0" nodeType="clickEffect">
+                                  <p:stCondLst>
+                                    <p:cond delay="0"/>
+                                  </p:stCondLst>
+                                  <p:childTnLst>
+                                    <p:set>
+                                      <p:cBhvr>
+                                        <p:cTn id="6" dur="1" fill="hold">
+                                          <p:stCondLst>
+                                            <p:cond delay="0"/>
+                                          </p:stCondLst>
+                                        </p:cTn>
+                                        <p:tgtEl>
+                                          <p:spTgt spid="11"/>
+                                        </p:tgtEl>
+                                        <p:attrNameLst>
+                                          <p:attrName>style.visibility</p:attrName>
+                                        </p:attrNameLst>
+                                      </p:cBhvr>
+                                      <p:to>
+                                        <p:strVal val="visible"/>
+                                      </p:to>
+                                    </p:set>
+                                  </p:childTnLst>
+                                </p:cTn>
+                              </p:par>
+                              <p:par>
+                                <p:cTn id="7" presetID="1" presetClass="entr" presetSubtype="0" fill="hold" grpId="0" nodeType="withEffect">
+                                  <p:stCondLst>
+                                    <p:cond delay="0"/>
+                                  </p:stCondLst>
+                                  <p:childTnLst>
+                                    <p:set>
+                                      <p:cBhvr>
+                                        <p:cTn id="8" dur="1" fill="hold">
+                                          <p:stCondLst>
+                                            <p:cond delay="0"/>
+                                          </p:stCondLst>
+                                        </p:cTn>
+                                        <p:tgtEl>
+                                          <p:spTgt spid="7"/>
+                                        </p:tgtEl>
+                                        <p:attrNameLst>
+                                          <p:attrName>style.visibility</p:attrName>
+                                        </p:attrNameLst>
+                                      </p:cBhvr>
+                                      <p:to>
+                                        <p:strVal val="visible"/>
+                                      </p:to>
+                                    </p:set>
+                                  </p:childTnLst>
+                                </p:cTn>
+                              </p:par>
+                              <p:par>
+                                <p:cTn id="9" presetID="1" presetClass="entr" presetSubtype="0" fill="hold" nodeType="withEffect">
+                                  <p:stCondLst>
+                                    <p:cond delay="0"/>
+                                  </p:stCondLst>
+                                  <p:childTnLst>
+                                    <p:set>
+                                      <p:cBhvr>
+                                        <p:cTn id="10" dur="1" fill="hold">
+                                          <p:stCondLst>
+                                            <p:cond delay="0"/>
+                                          </p:stCondLst>
+                                        </p:cTn>
+                                        <p:tgtEl>
+                                          <p:spTgt spid="6"/>
+                                        </p:tgtEl>
+                                        <p:attrNameLst>
+                                          <p:attrName>style.visibility</p:attrName>
+                                        </p:attrNameLst>
+                                      </p:cBhvr>
+                                      <p:to>
+                                        <p:strVal val="visible"/>
+                                      </p:to>
+                                    </p:set>
+                                  </p:childTnLst>
+                                </p:cTn>
+                              </p:par>
+                              <p:par>
+                                <p:cTn id="11" presetID="1" presetClass="entr" presetSubtype="0" fill="hold" grpId="0" nodeType="withEffect">
+                                  <p:stCondLst>
+                                    <p:cond delay="0"/>
+                                  </p:stCondLst>
+                                  <p:childTnLst>
+                                    <p:set>
+                                      <p:cBhvr>
+                                        <p:cTn id="12" dur="1" fill="hold">
+                                          <p:stCondLst>
+                                            <p:cond delay="0"/>
+                                          </p:stCondLst>
+                                        </p:cTn>
+                                        <p:tgtEl>
+                                          <p:spTgt spid="4"/>
+                                        </p:tgtEl>
+                                        <p:attrNameLst>
+                                          <p:attrName>style.visibility</p:attrName>
+                                        </p:attrNameLst>
+                                      </p:cBhvr>
+                                      <p:to>
+                                        <p:strVal val="visible"/>
+                                      </p:to>
+                                    </p:set>
+                                  </p:childTnLst>
+                                </p:cTn>
+                              </p:par>
+                              <p:par>
+                                <p:cTn id="13" presetID="1" presetClass="entr" presetSubtype="0" fill="hold" nodeType="withEffect">
+                                  <p:stCondLst>
+                                    <p:cond delay="0"/>
+                                  </p:stCondLst>
+                                  <p:childTnLst>
+                                    <p:set>
+                                      <p:cBhvr>
+                                        <p:cTn id="14" dur="1" fill="hold">
+                                          <p:stCondLst>
+                                            <p:cond delay="0"/>
+                                          </p:stCondLst>
+                                        </p:cTn>
+                                        <p:tgtEl>
+                                          <p:spTgt spid="13"/>
+                                        </p:tgtEl>
+                                        <p:attrNameLst>
+                                          <p:attrName>style.visibility</p:attrName>
+                                        </p:attrNameLst>
+                                      </p:cBhvr>
+                                      <p:to>
+                                        <p:strVal val="visible"/>
+                                      </p:to>
+                                    </p:set>
+                                  </p:childTnLst>
+                                </p:cTn>
+                              </p:par>
+                              <p:par>
+                                <p:cTn id="15" presetID="1" presetClass="entr" presetSubtype="0" fill="hold" grpId="0" nodeType="withEffect">
+                                  <p:stCondLst>
+                                    <p:cond delay="0"/>
+                                  </p:stCondLst>
+                                  <p:childTnLst>
+                                    <p:set>
+                                      <p:cBhvr>
+                                        <p:cTn id="16" dur="1" fill="hold">
+                                          <p:stCondLst>
+                                            <p:cond delay="0"/>
+                                          </p:stCondLst>
+                                        </p:cTn>
+                                        <p:tgtEl>
+                                          <p:spTgt spid="9"/>
+                                        </p:tgtEl>
+                                        <p:attrNameLst>
+                                          <p:attrName>style.visibility</p:attrName>
+                                        </p:attrNameLst>
+                                      </p:cBhvr>
+                                      <p:to>
+                                        <p:strVal val="visible"/>
+                                      </p:to>
+                                    </p:set>
+                                  </p:childTnLst>
+                                </p:cTn>
+                              </p:par>
+                              <p:par>
+                                <p:cTn id="17" presetID="1" presetClass="entr" presetSubtype="0" fill="hold" nodeType="withEffect">
+                                  <p:stCondLst>
+                                    <p:cond delay="0"/>
+                                  </p:stCondLst>
+                                  <p:childTnLst>
+                                    <p:set>
+                                      <p:cBhvr>
+                                        <p:cTn id="18" dur="1" fill="hold">
+                                          <p:stCondLst>
+                                            <p:cond delay="0"/>
+                                          </p:stCondLst>
+                                        </p:cTn>
+                                        <p:tgtEl>
+                                          <p:spTgt spid="20"/>
+                                        </p:tgtEl>
+                                        <p:attrNameLst>
+                                          <p:attrName>style.visibility</p:attrName>
+                                        </p:attrNameLst>
+                                      </p:cBhvr>
+                                      <p:to>
+                                        <p:strVal val="visible"/>
+                                      </p:to>
+                                    </p:set>
+                                  </p:childTnLst>
+                                </p:cTn>
+                              </p:par>
+                              <p:par>
+                                <p:cTn id="19" presetID="1" presetClass="entr" presetSubtype="0" fill="hold" grpId="0" nodeType="withEffect">
+                                  <p:stCondLst>
+                                    <p:cond delay="0"/>
+                                  </p:stCondLst>
+                                  <p:childTnLst>
+                                    <p:set>
+                                      <p:cBhvr>
+                                        <p:cTn id="20" dur="1" fill="hold">
+                                          <p:stCondLst>
+                                            <p:cond delay="0"/>
+                                          </p:stCondLst>
+                                        </p:cTn>
+                                        <p:tgtEl>
+                                          <p:spTgt spid="17"/>
+                                        </p:tgtEl>
+                                        <p:attrNameLst>
+                                          <p:attrName>style.visibility</p:attrName>
+                                        </p:attrNameLst>
+                                      </p:cBhvr>
+                                      <p:to>
+                                        <p:strVal val="visible"/>
+                                      </p:to>
+                                    </p:set>
+                                  </p:childTnLst>
+                                </p:cTn>
+                              </p:par>
+                              <p:par>
+                                <p:cTn id="21" presetID="1" presetClass="entr" presetSubtype="0" fill="hold" grpId="0" nodeType="withEffect">
+                                  <p:stCondLst>
+                                    <p:cond delay="0"/>
+                                  </p:stCondLst>
+                                  <p:childTnLst>
+                                    <p:set>
+                                      <p:cBhvr>
+                                        <p:cTn id="22" dur="1" fill="hold">
+                                          <p:stCondLst>
+                                            <p:cond delay="0"/>
+                                          </p:stCondLst>
+                                        </p:cTn>
+                                        <p:tgtEl>
+                                          <p:spTgt spid="16"/>
+                                        </p:tgtEl>
+                                        <p:attrNameLst>
+                                          <p:attrName>style.visibility</p:attrName>
+                                        </p:attrNameLst>
+                                      </p:cBhvr>
+                                      <p:to>
+                                        <p:strVal val="visible"/>
+                                      </p:to>
+                                    </p:set>
+                                  </p:childTnLst>
+                                </p:cTn>
+                              </p:par>
+                            </p:childTnLst>
+                          </p:cTn>
+                        </p:par>
+                      </p:childTnLst>
+                    </p:cTn>
+                  </p:par>
+                  <p:par>
+                    <p:cTn id="23" fill="hold">
+                      <p:stCondLst>
+                        <p:cond delay="indefinite"/>
+                      </p:stCondLst>
+                      <p:childTnLst>
+                        <p:par>
+                          <p:cTn id="24" fill="hold">
+                            <p:stCondLst>
+                              <p:cond delay="0"/>
+                            </p:stCondLst>
+                            <p:childTnLst>
+                              <p:par>
+                                <p:cTn id="25" presetID="1" presetClass="entr" presetSubtype="0" fill="hold" nodeType="clickEffect">
+                                  <p:stCondLst>
+                                    <p:cond delay="0"/>
+                                  </p:stCondLst>
+                                  <p:childTnLst>
+                                    <p:set>
+                                      <p:cBhvr>
+                                        <p:cTn id="26" dur="1" fill="hold">
+                                          <p:stCondLst>
+                                            <p:cond delay="0"/>
+                                          </p:stCondLst>
+                                        </p:cTn>
+                                        <p:tgtEl>
+                                          <p:spTgt spid="3">
+                                            <p:txEl>
+                                              <p:pRg st="8" end="8"/>
+                                            </p:txEl>
+                                          </p:spTgt>
+                                        </p:tgtEl>
+                                        <p:attrNameLst>
+                                          <p:attrName>style.visibility</p:attrName>
+                                        </p:attrNameLst>
+                                      </p:cBhvr>
+                                      <p:to>
+                                        <p:strVal val="visible"/>
+                                      </p:to>
+                                    </p:set>
+                                  </p:childTnLst>
+                                </p:cTn>
+                              </p:par>
+                            </p:childTnLst>
+                          </p:cTn>
+                        </p:par>
+                      </p:childTnLst>
+                    </p:cTn>
+                  </p:par>
+                </p:childTnLst>
+              </p:cTn>
+              <p:prevCondLst>
+                <p:cond evt="onPrev" delay="0">
+                  <p:tgtEl>
+                    <p:sldTgt/>
+                  </p:tgtEl>
+                </p:cond>
+              </p:prevCondLst>
+              <p:nextCondLst>
+                <p:cond evt="onNext" delay="0">
+                  <p:tgtEl>
+                    <p:sldTgt/>
+                  </p:tgtEl>
+                </p:cond>
+              </p:nextCondLst>
+            </p:seq>
+          </p:childTnLst>
+        </p:cTn>
       </p:par>
     </p:tnLst>
+    <p:bldLst>
+      <p:bldP spid="4" grpId="0"/>
+      <p:bldP spid="7" grpId="0" animBg="1"/>
+      <p:bldP spid="9" grpId="0"/>
+      <p:bldP spid="11" grpId="0" animBg="1"/>
+      <p:bldP spid="16" grpId="0" animBg="1"/>
+      <p:bldP spid="17" grpId="0"/>
+    </p:bldLst>
   </p:timing>
 </p:sld>
 </file>
@@ -5183,7 +5947,177 @@
   <p:timing>
     <p:tnLst>
       <p:par>
-        <p:cTn id="1" dur="indefinite" restart="never" nodeType="tmRoot"/>
+        <p:cTn id="1" dur="indefinite" restart="never" nodeType="tmRoot">
+          <p:childTnLst>
+            <p:seq concurrent="1" nextAc="seek">
+              <p:cTn id="2" dur="indefinite" nodeType="mainSeq">
+                <p:childTnLst>
+                  <p:par>
+                    <p:cTn id="3" fill="hold">
+                      <p:stCondLst>
+                        <p:cond delay="indefinite"/>
+                      </p:stCondLst>
+                      <p:childTnLst>
+                        <p:par>
+                          <p:cTn id="4" fill="hold">
+                            <p:stCondLst>
+                              <p:cond delay="0"/>
+                            </p:stCondLst>
+                            <p:childTnLst>
+                              <p:par>
+                                <p:cTn id="5" presetID="1" presetClass="entr" presetSubtype="0" fill="hold" nodeType="clickEffect">
+                                  <p:stCondLst>
+                                    <p:cond delay="0"/>
+                                  </p:stCondLst>
+                                  <p:childTnLst>
+                                    <p:set>
+                                      <p:cBhvr>
+                                        <p:cTn id="6" dur="1" fill="hold">
+                                          <p:stCondLst>
+                                            <p:cond delay="0"/>
+                                          </p:stCondLst>
+                                        </p:cTn>
+                                        <p:tgtEl>
+                                          <p:spTgt spid="3">
+                                            <p:txEl>
+                                              <p:pRg st="6" end="6"/>
+                                            </p:txEl>
+                                          </p:spTgt>
+                                        </p:tgtEl>
+                                        <p:attrNameLst>
+                                          <p:attrName>style.visibility</p:attrName>
+                                        </p:attrNameLst>
+                                      </p:cBhvr>
+                                      <p:to>
+                                        <p:strVal val="visible"/>
+                                      </p:to>
+                                    </p:set>
+                                  </p:childTnLst>
+                                </p:cTn>
+                              </p:par>
+                            </p:childTnLst>
+                          </p:cTn>
+                        </p:par>
+                      </p:childTnLst>
+                    </p:cTn>
+                  </p:par>
+                  <p:par>
+                    <p:cTn id="7" fill="hold">
+                      <p:stCondLst>
+                        <p:cond delay="indefinite"/>
+                      </p:stCondLst>
+                      <p:childTnLst>
+                        <p:par>
+                          <p:cTn id="8" fill="hold">
+                            <p:stCondLst>
+                              <p:cond delay="0"/>
+                            </p:stCondLst>
+                            <p:childTnLst>
+                              <p:par>
+                                <p:cTn id="9" presetID="1" presetClass="entr" presetSubtype="0" fill="hold" nodeType="clickEffect">
+                                  <p:stCondLst>
+                                    <p:cond delay="0"/>
+                                  </p:stCondLst>
+                                  <p:childTnLst>
+                                    <p:set>
+                                      <p:cBhvr>
+                                        <p:cTn id="10" dur="1" fill="hold">
+                                          <p:stCondLst>
+                                            <p:cond delay="0"/>
+                                          </p:stCondLst>
+                                        </p:cTn>
+                                        <p:tgtEl>
+                                          <p:spTgt spid="3">
+                                            <p:txEl>
+                                              <p:pRg st="7" end="7"/>
+                                            </p:txEl>
+                                          </p:spTgt>
+                                        </p:tgtEl>
+                                        <p:attrNameLst>
+                                          <p:attrName>style.visibility</p:attrName>
+                                        </p:attrNameLst>
+                                      </p:cBhvr>
+                                      <p:to>
+                                        <p:strVal val="visible"/>
+                                      </p:to>
+                                    </p:set>
+                                  </p:childTnLst>
+                                </p:cTn>
+                              </p:par>
+                            </p:childTnLst>
+                          </p:cTn>
+                        </p:par>
+                      </p:childTnLst>
+                    </p:cTn>
+                  </p:par>
+                  <p:par>
+                    <p:cTn id="11" fill="hold">
+                      <p:stCondLst>
+                        <p:cond delay="indefinite"/>
+                      </p:stCondLst>
+                      <p:childTnLst>
+                        <p:par>
+                          <p:cTn id="12" fill="hold">
+                            <p:stCondLst>
+                              <p:cond delay="0"/>
+                            </p:stCondLst>
+                            <p:childTnLst>
+                              <p:par>
+                                <p:cTn id="13" presetID="1" presetClass="entr" presetSubtype="0" fill="hold" nodeType="clickEffect">
+                                  <p:stCondLst>
+                                    <p:cond delay="0"/>
+                                  </p:stCondLst>
+                                  <p:childTnLst>
+                                    <p:set>
+                                      <p:cBhvr>
+                                        <p:cTn id="14" dur="1" fill="hold">
+                                          <p:stCondLst>
+                                            <p:cond delay="0"/>
+                                          </p:stCondLst>
+                                        </p:cTn>
+                                        <p:tgtEl>
+                                          <p:spTgt spid="3">
+                                            <p:txEl>
+                                              <p:pRg st="8" end="8"/>
+                                            </p:txEl>
+                                          </p:spTgt>
+                                        </p:tgtEl>
+                                        <p:attrNameLst>
+                                          <p:attrName>style.visibility</p:attrName>
+                                        </p:attrNameLst>
+                                      </p:cBhvr>
+                                      <p:to>
+                                        <p:strVal val="visible"/>
+                                      </p:to>
+                                    </p:set>
+                                  </p:childTnLst>
+                                </p:cTn>
+                              </p:par>
+                            </p:childTnLst>
+                          </p:cTn>
+                        </p:par>
+                      </p:childTnLst>
+                    </p:cTn>
+                  </p:par>
+                </p:childTnLst>
+              </p:cTn>
+              <p:prevCondLst>
+                <p:cond evt="onPrev" delay="0">
+                  <p:tgtEl>
+                    <p:sldTgt/>
+                  </p:tgtEl>
+                </p:cond>
+              </p:prevCondLst>
+              <p:nextCondLst>
+                <p:cond evt="onNext" delay="0">
+                  <p:tgtEl>
+                    <p:sldTgt/>
+                  </p:tgtEl>
+                </p:cond>
+              </p:nextCondLst>
+            </p:seq>
+          </p:childTnLst>
+        </p:cTn>
       </p:par>
     </p:tnLst>
   </p:timing>
@@ -5504,6 +6438,110 @@
           </a:p>
         </p:txBody>
       </p:sp>
+      <p:sp>
+        <p:nvSpPr>
+          <p:cNvPr id="4" name="TextBox 3"/>
+          <p:cNvSpPr txBox="1"/>
+          <p:nvPr/>
+        </p:nvSpPr>
+        <p:spPr>
+          <a:xfrm>
+            <a:off x="4661547" y="2351692"/>
+            <a:ext cx="7432035" cy="369332"/>
+          </a:xfrm>
+          <a:prstGeom prst="rect">
+            <a:avLst/>
+          </a:prstGeom>
+          <a:noFill/>
+        </p:spPr>
+        <p:txBody>
+          <a:bodyPr wrap="none" rtlCol="0">
+            <a:spAutoFit/>
+          </a:bodyPr>
+          <a:lstStyle/>
+          <a:p>
+            <a:r>
+              <a:rPr lang="en-GB" dirty="0" smtClean="0"/>
+              <a:t>Parameter(s) are place inside of parenthesis, use comma to separate multiple</a:t>
+            </a:r>
+            <a:endParaRPr lang="en-GB" dirty="0"/>
+          </a:p>
+        </p:txBody>
+      </p:sp>
+      <p:sp>
+        <p:nvSpPr>
+          <p:cNvPr id="5" name="Rectangle 4"/>
+          <p:cNvSpPr/>
+          <p:nvPr/>
+        </p:nvSpPr>
+        <p:spPr>
+          <a:xfrm>
+            <a:off x="4810539" y="2941983"/>
+            <a:ext cx="874644" cy="291547"/>
+          </a:xfrm>
+          <a:prstGeom prst="rect">
+            <a:avLst/>
+          </a:prstGeom>
+          <a:noFill/>
+        </p:spPr>
+        <p:style>
+          <a:lnRef idx="2">
+            <a:schemeClr val="accent1">
+              <a:shade val="50000"/>
+            </a:schemeClr>
+          </a:lnRef>
+          <a:fillRef idx="1">
+            <a:schemeClr val="accent1"/>
+          </a:fillRef>
+          <a:effectRef idx="0">
+            <a:schemeClr val="accent1"/>
+          </a:effectRef>
+          <a:fontRef idx="minor">
+            <a:schemeClr val="lt1"/>
+          </a:fontRef>
+        </p:style>
+        <p:txBody>
+          <a:bodyPr rtlCol="0" anchor="ctr"/>
+          <a:lstStyle/>
+          <a:p>
+            <a:pPr algn="ctr"/>
+            <a:endParaRPr lang="en-GB"/>
+          </a:p>
+        </p:txBody>
+      </p:sp>
+      <p:cxnSp>
+        <p:nvCxnSpPr>
+          <p:cNvPr id="7" name="Straight Arrow Connector 6"/>
+          <p:cNvCxnSpPr/>
+          <p:nvPr/>
+        </p:nvCxnSpPr>
+        <p:spPr>
+          <a:xfrm flipH="1">
+            <a:off x="5685183" y="2701146"/>
+            <a:ext cx="1404730" cy="240837"/>
+          </a:xfrm>
+          <a:prstGeom prst="straightConnector1">
+            <a:avLst/>
+          </a:prstGeom>
+          <a:ln w="38100">
+            <a:tailEnd type="triangle"/>
+          </a:ln>
+        </p:spPr>
+        <p:style>
+          <a:lnRef idx="1">
+            <a:schemeClr val="accent1"/>
+          </a:lnRef>
+          <a:fillRef idx="0">
+            <a:schemeClr val="accent1"/>
+          </a:fillRef>
+          <a:effectRef idx="0">
+            <a:schemeClr val="accent1"/>
+          </a:effectRef>
+          <a:fontRef idx="minor">
+            <a:schemeClr val="tx1"/>
+          </a:fontRef>
+        </p:style>
+      </p:cxnSp>
     </p:spTree>
     <p:extLst>
       <p:ext uri="{BB962C8B-B14F-4D97-AF65-F5344CB8AC3E}">
@@ -5517,9 +6555,233 @@
   <p:timing>
     <p:tnLst>
       <p:par>
-        <p:cTn id="1" dur="indefinite" restart="never" nodeType="tmRoot"/>
+        <p:cTn id="1" dur="indefinite" restart="never" nodeType="tmRoot">
+          <p:childTnLst>
+            <p:seq concurrent="1" nextAc="seek">
+              <p:cTn id="2" dur="indefinite" nodeType="mainSeq">
+                <p:childTnLst>
+                  <p:par>
+                    <p:cTn id="3" fill="hold">
+                      <p:stCondLst>
+                        <p:cond delay="indefinite"/>
+                      </p:stCondLst>
+                      <p:childTnLst>
+                        <p:par>
+                          <p:cTn id="4" fill="hold">
+                            <p:stCondLst>
+                              <p:cond delay="0"/>
+                            </p:stCondLst>
+                            <p:childTnLst>
+                              <p:par>
+                                <p:cTn id="5" presetID="1" presetClass="entr" presetSubtype="0" fill="hold" grpId="0" nodeType="clickEffect">
+                                  <p:stCondLst>
+                                    <p:cond delay="0"/>
+                                  </p:stCondLst>
+                                  <p:childTnLst>
+                                    <p:set>
+                                      <p:cBhvr>
+                                        <p:cTn id="6" dur="1" fill="hold">
+                                          <p:stCondLst>
+                                            <p:cond delay="0"/>
+                                          </p:stCondLst>
+                                        </p:cTn>
+                                        <p:tgtEl>
+                                          <p:spTgt spid="5"/>
+                                        </p:tgtEl>
+                                        <p:attrNameLst>
+                                          <p:attrName>style.visibility</p:attrName>
+                                        </p:attrNameLst>
+                                      </p:cBhvr>
+                                      <p:to>
+                                        <p:strVal val="visible"/>
+                                      </p:to>
+                                    </p:set>
+                                  </p:childTnLst>
+                                </p:cTn>
+                              </p:par>
+                              <p:par>
+                                <p:cTn id="7" presetID="1" presetClass="entr" presetSubtype="0" fill="hold" nodeType="withEffect">
+                                  <p:stCondLst>
+                                    <p:cond delay="0"/>
+                                  </p:stCondLst>
+                                  <p:childTnLst>
+                                    <p:set>
+                                      <p:cBhvr>
+                                        <p:cTn id="8" dur="1" fill="hold">
+                                          <p:stCondLst>
+                                            <p:cond delay="0"/>
+                                          </p:stCondLst>
+                                        </p:cTn>
+                                        <p:tgtEl>
+                                          <p:spTgt spid="7"/>
+                                        </p:tgtEl>
+                                        <p:attrNameLst>
+                                          <p:attrName>style.visibility</p:attrName>
+                                        </p:attrNameLst>
+                                      </p:cBhvr>
+                                      <p:to>
+                                        <p:strVal val="visible"/>
+                                      </p:to>
+                                    </p:set>
+                                  </p:childTnLst>
+                                </p:cTn>
+                              </p:par>
+                              <p:par>
+                                <p:cTn id="9" presetID="1" presetClass="entr" presetSubtype="0" fill="hold" grpId="0" nodeType="withEffect">
+                                  <p:stCondLst>
+                                    <p:cond delay="0"/>
+                                  </p:stCondLst>
+                                  <p:childTnLst>
+                                    <p:set>
+                                      <p:cBhvr>
+                                        <p:cTn id="10" dur="1" fill="hold">
+                                          <p:stCondLst>
+                                            <p:cond delay="0"/>
+                                          </p:stCondLst>
+                                        </p:cTn>
+                                        <p:tgtEl>
+                                          <p:spTgt spid="4"/>
+                                        </p:tgtEl>
+                                        <p:attrNameLst>
+                                          <p:attrName>style.visibility</p:attrName>
+                                        </p:attrNameLst>
+                                      </p:cBhvr>
+                                      <p:to>
+                                        <p:strVal val="visible"/>
+                                      </p:to>
+                                    </p:set>
+                                  </p:childTnLst>
+                                </p:cTn>
+                              </p:par>
+                            </p:childTnLst>
+                          </p:cTn>
+                        </p:par>
+                      </p:childTnLst>
+                    </p:cTn>
+                  </p:par>
+                  <p:par>
+                    <p:cTn id="11" fill="hold">
+                      <p:stCondLst>
+                        <p:cond delay="indefinite"/>
+                      </p:stCondLst>
+                      <p:childTnLst>
+                        <p:par>
+                          <p:cTn id="12" fill="hold">
+                            <p:stCondLst>
+                              <p:cond delay="0"/>
+                            </p:stCondLst>
+                            <p:childTnLst>
+                              <p:par>
+                                <p:cTn id="13" presetID="1" presetClass="entr" presetSubtype="0" fill="hold" nodeType="clickEffect">
+                                  <p:stCondLst>
+                                    <p:cond delay="0"/>
+                                  </p:stCondLst>
+                                  <p:childTnLst>
+                                    <p:set>
+                                      <p:cBhvr>
+                                        <p:cTn id="14" dur="1" fill="hold">
+                                          <p:stCondLst>
+                                            <p:cond delay="0"/>
+                                          </p:stCondLst>
+                                        </p:cTn>
+                                        <p:tgtEl>
+                                          <p:spTgt spid="3">
+                                            <p:txEl>
+                                              <p:pRg st="7" end="7"/>
+                                            </p:txEl>
+                                          </p:spTgt>
+                                        </p:tgtEl>
+                                        <p:attrNameLst>
+                                          <p:attrName>style.visibility</p:attrName>
+                                        </p:attrNameLst>
+                                      </p:cBhvr>
+                                      <p:to>
+                                        <p:strVal val="visible"/>
+                                      </p:to>
+                                    </p:set>
+                                  </p:childTnLst>
+                                </p:cTn>
+                              </p:par>
+                            </p:childTnLst>
+                          </p:cTn>
+                        </p:par>
+                      </p:childTnLst>
+                    </p:cTn>
+                  </p:par>
+                  <p:par>
+                    <p:cTn id="15" fill="hold">
+                      <p:stCondLst>
+                        <p:cond delay="indefinite"/>
+                      </p:stCondLst>
+                      <p:childTnLst>
+                        <p:par>
+                          <p:cTn id="16" fill="hold">
+                            <p:stCondLst>
+                              <p:cond delay="0"/>
+                            </p:stCondLst>
+                            <p:childTnLst>
+                              <p:par>
+                                <p:cTn id="17" presetID="1" presetClass="entr" presetSubtype="0" fill="hold" nodeType="clickEffect">
+                                  <p:stCondLst>
+                                    <p:cond delay="0"/>
+                                  </p:stCondLst>
+                                  <p:childTnLst>
+                                    <p:set>
+                                      <p:cBhvr>
+                                        <p:cTn id="18" dur="1" fill="hold">
+                                          <p:stCondLst>
+                                            <p:cond delay="0"/>
+                                          </p:stCondLst>
+                                        </p:cTn>
+                                        <p:tgtEl>
+                                          <p:spTgt spid="3">
+                                            <p:txEl>
+                                              <p:pRg st="8" end="8"/>
+                                            </p:txEl>
+                                          </p:spTgt>
+                                        </p:tgtEl>
+                                        <p:attrNameLst>
+                                          <p:attrName>style.visibility</p:attrName>
+                                        </p:attrNameLst>
+                                      </p:cBhvr>
+                                      <p:to>
+                                        <p:strVal val="visible"/>
+                                      </p:to>
+                                    </p:set>
+                                  </p:childTnLst>
+                                </p:cTn>
+                              </p:par>
+                            </p:childTnLst>
+                          </p:cTn>
+                        </p:par>
+                      </p:childTnLst>
+                    </p:cTn>
+                  </p:par>
+                </p:childTnLst>
+              </p:cTn>
+              <p:prevCondLst>
+                <p:cond evt="onPrev" delay="0">
+                  <p:tgtEl>
+                    <p:sldTgt/>
+                  </p:tgtEl>
+                </p:cond>
+              </p:prevCondLst>
+              <p:nextCondLst>
+                <p:cond evt="onNext" delay="0">
+                  <p:tgtEl>
+                    <p:sldTgt/>
+                  </p:tgtEl>
+                </p:cond>
+              </p:nextCondLst>
+            </p:seq>
+          </p:childTnLst>
+        </p:cTn>
       </p:par>
     </p:tnLst>
+    <p:bldLst>
+      <p:bldP spid="4" grpId="0"/>
+      <p:bldP spid="5" grpId="0" animBg="1"/>
+    </p:bldLst>
   </p:timing>
 </p:sld>
 </file>
@@ -5888,9 +7150,208 @@
   <p:timing>
     <p:tnLst>
       <p:par>
-        <p:cTn id="1" dur="indefinite" restart="never" nodeType="tmRoot"/>
+        <p:cTn id="1" dur="indefinite" restart="never" nodeType="tmRoot">
+          <p:childTnLst>
+            <p:seq concurrent="1" nextAc="seek">
+              <p:cTn id="2" dur="indefinite" nodeType="mainSeq">
+                <p:childTnLst>
+                  <p:par>
+                    <p:cTn id="3" fill="hold">
+                      <p:stCondLst>
+                        <p:cond delay="indefinite"/>
+                      </p:stCondLst>
+                      <p:childTnLst>
+                        <p:par>
+                          <p:cTn id="4" fill="hold">
+                            <p:stCondLst>
+                              <p:cond delay="0"/>
+                            </p:stCondLst>
+                            <p:childTnLst>
+                              <p:par>
+                                <p:cTn id="5" presetID="1" presetClass="entr" presetSubtype="0" fill="hold" grpId="0" nodeType="clickEffect">
+                                  <p:stCondLst>
+                                    <p:cond delay="0"/>
+                                  </p:stCondLst>
+                                  <p:childTnLst>
+                                    <p:set>
+                                      <p:cBhvr>
+                                        <p:cTn id="6" dur="1" fill="hold">
+                                          <p:stCondLst>
+                                            <p:cond delay="0"/>
+                                          </p:stCondLst>
+                                        </p:cTn>
+                                        <p:tgtEl>
+                                          <p:spTgt spid="4"/>
+                                        </p:tgtEl>
+                                        <p:attrNameLst>
+                                          <p:attrName>style.visibility</p:attrName>
+                                        </p:attrNameLst>
+                                      </p:cBhvr>
+                                      <p:to>
+                                        <p:strVal val="visible"/>
+                                      </p:to>
+                                    </p:set>
+                                  </p:childTnLst>
+                                </p:cTn>
+                              </p:par>
+                              <p:par>
+                                <p:cTn id="7" presetID="1" presetClass="entr" presetSubtype="0" fill="hold" nodeType="withEffect">
+                                  <p:stCondLst>
+                                    <p:cond delay="0"/>
+                                  </p:stCondLst>
+                                  <p:childTnLst>
+                                    <p:set>
+                                      <p:cBhvr>
+                                        <p:cTn id="8" dur="1" fill="hold">
+                                          <p:stCondLst>
+                                            <p:cond delay="0"/>
+                                          </p:stCondLst>
+                                        </p:cTn>
+                                        <p:tgtEl>
+                                          <p:spTgt spid="7"/>
+                                        </p:tgtEl>
+                                        <p:attrNameLst>
+                                          <p:attrName>style.visibility</p:attrName>
+                                        </p:attrNameLst>
+                                      </p:cBhvr>
+                                      <p:to>
+                                        <p:strVal val="visible"/>
+                                      </p:to>
+                                    </p:set>
+                                  </p:childTnLst>
+                                </p:cTn>
+                              </p:par>
+                              <p:par>
+                                <p:cTn id="9" presetID="1" presetClass="entr" presetSubtype="0" fill="hold" grpId="0" nodeType="withEffect">
+                                  <p:stCondLst>
+                                    <p:cond delay="0"/>
+                                  </p:stCondLst>
+                                  <p:childTnLst>
+                                    <p:set>
+                                      <p:cBhvr>
+                                        <p:cTn id="10" dur="1" fill="hold">
+                                          <p:stCondLst>
+                                            <p:cond delay="0"/>
+                                          </p:stCondLst>
+                                        </p:cTn>
+                                        <p:tgtEl>
+                                          <p:spTgt spid="5"/>
+                                        </p:tgtEl>
+                                        <p:attrNameLst>
+                                          <p:attrName>style.visibility</p:attrName>
+                                        </p:attrNameLst>
+                                      </p:cBhvr>
+                                      <p:to>
+                                        <p:strVal val="visible"/>
+                                      </p:to>
+                                    </p:set>
+                                  </p:childTnLst>
+                                </p:cTn>
+                              </p:par>
+                            </p:childTnLst>
+                          </p:cTn>
+                        </p:par>
+                      </p:childTnLst>
+                    </p:cTn>
+                  </p:par>
+                  <p:par>
+                    <p:cTn id="11" fill="hold">
+                      <p:stCondLst>
+                        <p:cond delay="indefinite"/>
+                      </p:stCondLst>
+                      <p:childTnLst>
+                        <p:par>
+                          <p:cTn id="12" fill="hold">
+                            <p:stCondLst>
+                              <p:cond delay="0"/>
+                            </p:stCondLst>
+                            <p:childTnLst>
+                              <p:par>
+                                <p:cTn id="13" presetID="1" presetClass="entr" presetSubtype="0" fill="hold" nodeType="clickEffect">
+                                  <p:stCondLst>
+                                    <p:cond delay="0"/>
+                                  </p:stCondLst>
+                                  <p:childTnLst>
+                                    <p:set>
+                                      <p:cBhvr>
+                                        <p:cTn id="14" dur="1" fill="hold">
+                                          <p:stCondLst>
+                                            <p:cond delay="0"/>
+                                          </p:stCondLst>
+                                        </p:cTn>
+                                        <p:tgtEl>
+                                          <p:spTgt spid="10"/>
+                                        </p:tgtEl>
+                                        <p:attrNameLst>
+                                          <p:attrName>style.visibility</p:attrName>
+                                        </p:attrNameLst>
+                                      </p:cBhvr>
+                                      <p:to>
+                                        <p:strVal val="visible"/>
+                                      </p:to>
+                                    </p:set>
+                                  </p:childTnLst>
+                                </p:cTn>
+                              </p:par>
+                              <p:par>
+                                <p:cTn id="15" presetID="1" presetClass="entr" presetSubtype="0" fill="hold" grpId="0" nodeType="withEffect">
+                                  <p:stCondLst>
+                                    <p:cond delay="0"/>
+                                  </p:stCondLst>
+                                  <p:childTnLst>
+                                    <p:set>
+                                      <p:cBhvr>
+                                        <p:cTn id="16" dur="1" fill="hold">
+                                          <p:stCondLst>
+                                            <p:cond delay="0"/>
+                                          </p:stCondLst>
+                                        </p:cTn>
+                                        <p:tgtEl>
+                                          <p:spTgt spid="8"/>
+                                        </p:tgtEl>
+                                        <p:attrNameLst>
+                                          <p:attrName>style.visibility</p:attrName>
+                                        </p:attrNameLst>
+                                      </p:cBhvr>
+                                      <p:to>
+                                        <p:strVal val="visible"/>
+                                      </p:to>
+                                    </p:set>
+                                  </p:childTnLst>
+                                </p:cTn>
+                              </p:par>
+                            </p:childTnLst>
+                          </p:cTn>
+                        </p:par>
+                      </p:childTnLst>
+                    </p:cTn>
+                  </p:par>
+                </p:childTnLst>
+              </p:cTn>
+              <p:prevCondLst>
+                <p:cond evt="onPrev" delay="0">
+                  <p:tgtEl>
+                    <p:sldTgt/>
+                  </p:tgtEl>
+                </p:cond>
+              </p:prevCondLst>
+              <p:nextCondLst>
+                <p:cond evt="onNext" delay="0">
+                  <p:tgtEl>
+                    <p:sldTgt/>
+                  </p:tgtEl>
+                </p:cond>
+              </p:nextCondLst>
+            </p:seq>
+          </p:childTnLst>
+        </p:cTn>
       </p:par>
     </p:tnLst>
+    <p:bldLst>
+      <p:bldP spid="4" grpId="0" animBg="1"/>
+      <p:bldP spid="5" grpId="0"/>
+      <p:bldP spid="8" grpId="0"/>
+    </p:bldLst>
   </p:timing>
 </p:sld>
 </file>
@@ -6285,9 +7746,180 @@
   <p:timing>
     <p:tnLst>
       <p:par>
-        <p:cTn id="1" dur="indefinite" restart="never" nodeType="tmRoot"/>
+        <p:cTn id="1" dur="indefinite" restart="never" nodeType="tmRoot">
+          <p:childTnLst>
+            <p:seq concurrent="1" nextAc="seek">
+              <p:cTn id="2" dur="indefinite" nodeType="mainSeq">
+                <p:childTnLst>
+                  <p:par>
+                    <p:cTn id="3" fill="hold">
+                      <p:stCondLst>
+                        <p:cond delay="indefinite"/>
+                      </p:stCondLst>
+                      <p:childTnLst>
+                        <p:par>
+                          <p:cTn id="4" fill="hold">
+                            <p:stCondLst>
+                              <p:cond delay="0"/>
+                            </p:stCondLst>
+                            <p:childTnLst>
+                              <p:par>
+                                <p:cTn id="5" presetID="1" presetClass="entr" presetSubtype="0" fill="hold" grpId="0" nodeType="clickEffect">
+                                  <p:stCondLst>
+                                    <p:cond delay="0"/>
+                                  </p:stCondLst>
+                                  <p:childTnLst>
+                                    <p:set>
+                                      <p:cBhvr>
+                                        <p:cTn id="6" dur="1" fill="hold">
+                                          <p:stCondLst>
+                                            <p:cond delay="0"/>
+                                          </p:stCondLst>
+                                        </p:cTn>
+                                        <p:tgtEl>
+                                          <p:spTgt spid="8"/>
+                                        </p:tgtEl>
+                                        <p:attrNameLst>
+                                          <p:attrName>style.visibility</p:attrName>
+                                        </p:attrNameLst>
+                                      </p:cBhvr>
+                                      <p:to>
+                                        <p:strVal val="visible"/>
+                                      </p:to>
+                                    </p:set>
+                                  </p:childTnLst>
+                                </p:cTn>
+                              </p:par>
+                              <p:par>
+                                <p:cTn id="7" presetID="1" presetClass="entr" presetSubtype="0" fill="hold" nodeType="withEffect">
+                                  <p:stCondLst>
+                                    <p:cond delay="0"/>
+                                  </p:stCondLst>
+                                  <p:childTnLst>
+                                    <p:set>
+                                      <p:cBhvr>
+                                        <p:cTn id="8" dur="1" fill="hold">
+                                          <p:stCondLst>
+                                            <p:cond delay="0"/>
+                                          </p:stCondLst>
+                                        </p:cTn>
+                                        <p:tgtEl>
+                                          <p:spTgt spid="10"/>
+                                        </p:tgtEl>
+                                        <p:attrNameLst>
+                                          <p:attrName>style.visibility</p:attrName>
+                                        </p:attrNameLst>
+                                      </p:cBhvr>
+                                      <p:to>
+                                        <p:strVal val="visible"/>
+                                      </p:to>
+                                    </p:set>
+                                  </p:childTnLst>
+                                </p:cTn>
+                              </p:par>
+                            </p:childTnLst>
+                          </p:cTn>
+                        </p:par>
+                      </p:childTnLst>
+                    </p:cTn>
+                  </p:par>
+                  <p:par>
+                    <p:cTn id="9" fill="hold">
+                      <p:stCondLst>
+                        <p:cond delay="indefinite"/>
+                      </p:stCondLst>
+                      <p:childTnLst>
+                        <p:par>
+                          <p:cTn id="10" fill="hold">
+                            <p:stCondLst>
+                              <p:cond delay="0"/>
+                            </p:stCondLst>
+                            <p:childTnLst>
+                              <p:par>
+                                <p:cTn id="11" presetID="1" presetClass="entr" presetSubtype="0" fill="hold" grpId="0" nodeType="clickEffect">
+                                  <p:stCondLst>
+                                    <p:cond delay="0"/>
+                                  </p:stCondLst>
+                                  <p:childTnLst>
+                                    <p:set>
+                                      <p:cBhvr>
+                                        <p:cTn id="12" dur="1" fill="hold">
+                                          <p:stCondLst>
+                                            <p:cond delay="0"/>
+                                          </p:stCondLst>
+                                        </p:cTn>
+                                        <p:tgtEl>
+                                          <p:spTgt spid="11"/>
+                                        </p:tgtEl>
+                                        <p:attrNameLst>
+                                          <p:attrName>style.visibility</p:attrName>
+                                        </p:attrNameLst>
+                                      </p:cBhvr>
+                                      <p:to>
+                                        <p:strVal val="visible"/>
+                                      </p:to>
+                                    </p:set>
+                                  </p:childTnLst>
+                                </p:cTn>
+                              </p:par>
+                              <p:par>
+                                <p:cTn id="13" presetID="1" presetClass="entr" presetSubtype="0" fill="hold" nodeType="withEffect">
+                                  <p:stCondLst>
+                                    <p:cond delay="0"/>
+                                  </p:stCondLst>
+                                  <p:childTnLst>
+                                    <p:set>
+                                      <p:cBhvr>
+                                        <p:cTn id="14" dur="1" fill="hold">
+                                          <p:stCondLst>
+                                            <p:cond delay="0"/>
+                                          </p:stCondLst>
+                                        </p:cTn>
+                                        <p:tgtEl>
+                                          <p:spTgt spid="12"/>
+                                        </p:tgtEl>
+                                        <p:attrNameLst>
+                                          <p:attrName>style.visibility</p:attrName>
+                                        </p:attrNameLst>
+                                      </p:cBhvr>
+                                      <p:to>
+                                        <p:strVal val="visible"/>
+                                      </p:to>
+                                    </p:set>
+                                  </p:childTnLst>
+                                </p:cTn>
+                              </p:par>
+                            </p:childTnLst>
+                          </p:cTn>
+                        </p:par>
+                      </p:childTnLst>
+                    </p:cTn>
+                  </p:par>
+                </p:childTnLst>
+              </p:cTn>
+              <p:prevCondLst>
+                <p:cond evt="onPrev" delay="0">
+                  <p:tgtEl>
+                    <p:sldTgt/>
+                  </p:tgtEl>
+                </p:cond>
+              </p:prevCondLst>
+              <p:nextCondLst>
+                <p:cond evt="onNext" delay="0">
+                  <p:tgtEl>
+                    <p:sldTgt/>
+                  </p:tgtEl>
+                </p:cond>
+              </p:nextCondLst>
+            </p:seq>
+          </p:childTnLst>
+        </p:cTn>
       </p:par>
     </p:tnLst>
+    <p:bldLst>
+      <p:bldP spid="8" grpId="0"/>
+      <p:bldP spid="11" grpId="0"/>
+    </p:bldLst>
   </p:timing>
 </p:sld>
 </file>
@@ -6823,9 +8455,184 @@
   <p:timing>
     <p:tnLst>
       <p:par>
-        <p:cTn id="1" dur="indefinite" restart="never" nodeType="tmRoot"/>
+        <p:cTn id="1" dur="indefinite" restart="never" nodeType="tmRoot">
+          <p:childTnLst>
+            <p:seq concurrent="1" nextAc="seek">
+              <p:cTn id="2" dur="indefinite" nodeType="mainSeq">
+                <p:childTnLst>
+                  <p:par>
+                    <p:cTn id="3" fill="hold">
+                      <p:stCondLst>
+                        <p:cond delay="indefinite"/>
+                      </p:stCondLst>
+                      <p:childTnLst>
+                        <p:par>
+                          <p:cTn id="4" fill="hold">
+                            <p:stCondLst>
+                              <p:cond delay="0"/>
+                            </p:stCondLst>
+                            <p:childTnLst>
+                              <p:par>
+                                <p:cTn id="5" presetID="1" presetClass="entr" presetSubtype="0" fill="hold" grpId="0" nodeType="clickEffect">
+                                  <p:stCondLst>
+                                    <p:cond delay="0"/>
+                                  </p:stCondLst>
+                                  <p:childTnLst>
+                                    <p:set>
+                                      <p:cBhvr>
+                                        <p:cTn id="6" dur="1" fill="hold">
+                                          <p:stCondLst>
+                                            <p:cond delay="0"/>
+                                          </p:stCondLst>
+                                        </p:cTn>
+                                        <p:tgtEl>
+                                          <p:spTgt spid="7"/>
+                                        </p:tgtEl>
+                                        <p:attrNameLst>
+                                          <p:attrName>style.visibility</p:attrName>
+                                        </p:attrNameLst>
+                                      </p:cBhvr>
+                                      <p:to>
+                                        <p:strVal val="visible"/>
+                                      </p:to>
+                                    </p:set>
+                                  </p:childTnLst>
+                                </p:cTn>
+                              </p:par>
+                              <p:par>
+                                <p:cTn id="7" presetID="1" presetClass="entr" presetSubtype="0" fill="hold" nodeType="withEffect">
+                                  <p:stCondLst>
+                                    <p:cond delay="0"/>
+                                  </p:stCondLst>
+                                  <p:childTnLst>
+                                    <p:set>
+                                      <p:cBhvr>
+                                        <p:cTn id="8" dur="1" fill="hold">
+                                          <p:stCondLst>
+                                            <p:cond delay="0"/>
+                                          </p:stCondLst>
+                                        </p:cTn>
+                                        <p:tgtEl>
+                                          <p:spTgt spid="6"/>
+                                        </p:tgtEl>
+                                        <p:attrNameLst>
+                                          <p:attrName>style.visibility</p:attrName>
+                                        </p:attrNameLst>
+                                      </p:cBhvr>
+                                      <p:to>
+                                        <p:strVal val="visible"/>
+                                      </p:to>
+                                    </p:set>
+                                  </p:childTnLst>
+                                </p:cTn>
+                              </p:par>
+                              <p:par>
+                                <p:cTn id="9" presetID="1" presetClass="entr" presetSubtype="0" fill="hold" grpId="0" nodeType="withEffect">
+                                  <p:stCondLst>
+                                    <p:cond delay="0"/>
+                                  </p:stCondLst>
+                                  <p:childTnLst>
+                                    <p:set>
+                                      <p:cBhvr>
+                                        <p:cTn id="10" dur="1" fill="hold">
+                                          <p:stCondLst>
+                                            <p:cond delay="0"/>
+                                          </p:stCondLst>
+                                        </p:cTn>
+                                        <p:tgtEl>
+                                          <p:spTgt spid="4"/>
+                                        </p:tgtEl>
+                                        <p:attrNameLst>
+                                          <p:attrName>style.visibility</p:attrName>
+                                        </p:attrNameLst>
+                                      </p:cBhvr>
+                                      <p:to>
+                                        <p:strVal val="visible"/>
+                                      </p:to>
+                                    </p:set>
+                                  </p:childTnLst>
+                                </p:cTn>
+                              </p:par>
+                            </p:childTnLst>
+                          </p:cTn>
+                        </p:par>
+                      </p:childTnLst>
+                    </p:cTn>
+                  </p:par>
+                  <p:par>
+                    <p:cTn id="11" fill="hold">
+                      <p:stCondLst>
+                        <p:cond delay="indefinite"/>
+                      </p:stCondLst>
+                      <p:childTnLst>
+                        <p:par>
+                          <p:cTn id="12" fill="hold">
+                            <p:stCondLst>
+                              <p:cond delay="0"/>
+                            </p:stCondLst>
+                            <p:childTnLst>
+                              <p:par>
+                                <p:cTn id="13" presetID="1" presetClass="entr" presetSubtype="0" fill="hold" nodeType="clickEffect">
+                                  <p:stCondLst>
+                                    <p:cond delay="0"/>
+                                  </p:stCondLst>
+                                  <p:childTnLst>
+                                    <p:set>
+                                      <p:cBhvr>
+                                        <p:cTn id="14" dur="1" fill="hold">
+                                          <p:stCondLst>
+                                            <p:cond delay="0"/>
+                                          </p:stCondLst>
+                                        </p:cTn>
+                                        <p:tgtEl>
+                                          <p:spTgt spid="3">
+                                            <p:txEl>
+                                              <p:pRg st="8" end="8"/>
+                                            </p:txEl>
+                                          </p:spTgt>
+                                        </p:tgtEl>
+                                        <p:attrNameLst>
+                                          <p:attrName>style.visibility</p:attrName>
+                                        </p:attrNameLst>
+                                      </p:cBhvr>
+                                      <p:to>
+                                        <p:strVal val="visible"/>
+                                      </p:to>
+                                    </p:set>
+                                  </p:childTnLst>
+                                </p:cTn>
+                              </p:par>
+                            </p:childTnLst>
+                          </p:cTn>
+                        </p:par>
+                      </p:childTnLst>
+                    </p:cTn>
+                  </p:par>
+                </p:childTnLst>
+              </p:cTn>
+              <p:prevCondLst>
+                <p:cond evt="onPrev" delay="0">
+                  <p:tgtEl>
+                    <p:sldTgt/>
+                  </p:tgtEl>
+                </p:cond>
+              </p:prevCondLst>
+              <p:nextCondLst>
+                <p:cond evt="onNext" delay="0">
+                  <p:tgtEl>
+                    <p:sldTgt/>
+                  </p:tgtEl>
+                </p:cond>
+              </p:nextCondLst>
+            </p:seq>
+          </p:childTnLst>
+        </p:cTn>
       </p:par>
     </p:tnLst>
+    <p:bldLst>
+      <p:bldP spid="4" grpId="0"/>
+      <p:bldP spid="7" grpId="0" animBg="1"/>
+    </p:bldLst>
   </p:timing>
 </p:sld>
 </file>

</xml_diff>